<commit_message>
approach.pptx has been modified
</commit_message>
<xml_diff>
--- a/pres/approach.pptx
+++ b/pres/approach.pptx
@@ -4655,7 +4655,7 @@
                 <a:ea typeface="+mn-lt"/>
                 <a:cs typeface="+mn-lt"/>
               </a:rPr>
-              <a:t>   - Optimize initial conditions and parameters until accuracy reaches 90%.</a:t>
+              <a:t>   - Optimize initial conditions and parameters until accuracy reaches for example: 90%.</a:t>
             </a:r>
             <a:endParaRPr lang="en-US" sz="1400" dirty="0"/>
           </a:p>
@@ -4791,7 +4791,7 @@
                 <a:ea typeface="+mn-lt"/>
                 <a:cs typeface="+mn-lt"/>
               </a:rPr>
-              <a:t>   - Output the best optimized initial conditions.</a:t>
+              <a:t>   - Output the best optimized initial conditions and parameters.</a:t>
             </a:r>
             <a:endParaRPr lang="en-US" sz="1400" dirty="0"/>
           </a:p>

</xml_diff>

<commit_message>
approach.pptx has been updated
</commit_message>
<xml_diff>
--- a/pres/approach.pptx
+++ b/pres/approach.pptx
@@ -255,7 +255,7 @@
           <a:p>
             <a:fld id="{846CE7D5-CF57-46EF-B807-FDD0502418D4}" type="datetimeFigureOut">
               <a:rPr lang="en-US" smtClean="0"/>
-              <a:t>7/15/2024</a:t>
+              <a:t>7/16/2024</a:t>
             </a:fld>
             <a:endParaRPr lang="en-US"/>
           </a:p>
@@ -425,7 +425,7 @@
           <a:p>
             <a:fld id="{846CE7D5-CF57-46EF-B807-FDD0502418D4}" type="datetimeFigureOut">
               <a:rPr lang="en-US" smtClean="0"/>
-              <a:t>7/15/2024</a:t>
+              <a:t>7/16/2024</a:t>
             </a:fld>
             <a:endParaRPr lang="en-US"/>
           </a:p>
@@ -605,7 +605,7 @@
           <a:p>
             <a:fld id="{846CE7D5-CF57-46EF-B807-FDD0502418D4}" type="datetimeFigureOut">
               <a:rPr lang="en-US" smtClean="0"/>
-              <a:t>7/15/2024</a:t>
+              <a:t>7/16/2024</a:t>
             </a:fld>
             <a:endParaRPr lang="en-US"/>
           </a:p>
@@ -775,7 +775,7 @@
           <a:p>
             <a:fld id="{846CE7D5-CF57-46EF-B807-FDD0502418D4}" type="datetimeFigureOut">
               <a:rPr lang="en-US" smtClean="0"/>
-              <a:t>7/15/2024</a:t>
+              <a:t>7/16/2024</a:t>
             </a:fld>
             <a:endParaRPr lang="en-US"/>
           </a:p>
@@ -1021,7 +1021,7 @@
           <a:p>
             <a:fld id="{846CE7D5-CF57-46EF-B807-FDD0502418D4}" type="datetimeFigureOut">
               <a:rPr lang="en-US" smtClean="0"/>
-              <a:t>7/15/2024</a:t>
+              <a:t>7/16/2024</a:t>
             </a:fld>
             <a:endParaRPr lang="en-US"/>
           </a:p>
@@ -1253,7 +1253,7 @@
           <a:p>
             <a:fld id="{846CE7D5-CF57-46EF-B807-FDD0502418D4}" type="datetimeFigureOut">
               <a:rPr lang="en-US" smtClean="0"/>
-              <a:t>7/15/2024</a:t>
+              <a:t>7/16/2024</a:t>
             </a:fld>
             <a:endParaRPr lang="en-US"/>
           </a:p>
@@ -1620,7 +1620,7 @@
           <a:p>
             <a:fld id="{846CE7D5-CF57-46EF-B807-FDD0502418D4}" type="datetimeFigureOut">
               <a:rPr lang="en-US" smtClean="0"/>
-              <a:t>7/15/2024</a:t>
+              <a:t>7/16/2024</a:t>
             </a:fld>
             <a:endParaRPr lang="en-US"/>
           </a:p>
@@ -1738,7 +1738,7 @@
           <a:p>
             <a:fld id="{846CE7D5-CF57-46EF-B807-FDD0502418D4}" type="datetimeFigureOut">
               <a:rPr lang="en-US" smtClean="0"/>
-              <a:t>7/15/2024</a:t>
+              <a:t>7/16/2024</a:t>
             </a:fld>
             <a:endParaRPr lang="en-US"/>
           </a:p>
@@ -1833,7 +1833,7 @@
           <a:p>
             <a:fld id="{846CE7D5-CF57-46EF-B807-FDD0502418D4}" type="datetimeFigureOut">
               <a:rPr lang="en-US" smtClean="0"/>
-              <a:t>7/15/2024</a:t>
+              <a:t>7/16/2024</a:t>
             </a:fld>
             <a:endParaRPr lang="en-US"/>
           </a:p>
@@ -2110,7 +2110,7 @@
           <a:p>
             <a:fld id="{846CE7D5-CF57-46EF-B807-FDD0502418D4}" type="datetimeFigureOut">
               <a:rPr lang="en-US" smtClean="0"/>
-              <a:t>7/15/2024</a:t>
+              <a:t>7/16/2024</a:t>
             </a:fld>
             <a:endParaRPr lang="en-US"/>
           </a:p>
@@ -2367,7 +2367,7 @@
           <a:p>
             <a:fld id="{846CE7D5-CF57-46EF-B807-FDD0502418D4}" type="datetimeFigureOut">
               <a:rPr lang="en-US" smtClean="0"/>
-              <a:t>7/15/2024</a:t>
+              <a:t>7/16/2024</a:t>
             </a:fld>
             <a:endParaRPr lang="en-US"/>
           </a:p>
@@ -2580,7 +2580,7 @@
           <a:p>
             <a:fld id="{846CE7D5-CF57-46EF-B807-FDD0502418D4}" type="datetimeFigureOut">
               <a:rPr lang="en-US" smtClean="0"/>
-              <a:t>7/15/2024</a:t>
+              <a:t>7/16/2024</a:t>
             </a:fld>
             <a:endParaRPr lang="en-US"/>
           </a:p>
@@ -4588,7 +4588,7 @@
         <p:spPr>
           <a:xfrm>
             <a:off x="656165" y="740834"/>
-            <a:ext cx="7004267" cy="6709529"/>
+            <a:ext cx="7004267" cy="6924973"/>
           </a:xfrm>
           <a:prstGeom prst="rect">
             <a:avLst/>
@@ -4799,6 +4799,18 @@
             <a:endParaRPr lang="en-US" sz="1400" dirty="0"/>
           </a:p>
           <a:p>
+            <a:r>
+              <a:rPr lang="en-US" sz="1600" b="1" dirty="0"/>
+              <a:t>Pooling</a:t>
+            </a:r>
+            <a:r>
+              <a:rPr lang="de-DE" sz="1600" b="1" dirty="0"/>
+              <a:t>:  </a:t>
+            </a:r>
+            <a:r>
+              <a:rPr lang="de-DE" sz="1400" dirty="0"/>
+              <a:t>https://doi.org/10.48550/arXiv.2009.07485</a:t>
+            </a:r>
             <a:endParaRPr lang="en-US" sz="1400" dirty="0"/>
           </a:p>
           <a:p>

</xml_diff>